<commit_message>
added clamp cad + cvd film lecture
</commit_message>
<xml_diff>
--- a/jiao-research/notes/review-of-cvd-of-graphene-and-apps.pptx
+++ b/jiao-research/notes/review-of-cvd-of-graphene-and-apps.pptx
@@ -109,6 +109,11 @@
       </a:defRPr>
     </a:lvl9pPr>
   </p:defaultTextStyle>
+  <p:extLst>
+    <p:ext uri="{EFAFB233-063F-42B5-8137-9DF3F51BA10A}">
+      <p15:sldGuideLst xmlns:p15="http://schemas.microsoft.com/office/powerpoint/2012/main"/>
+    </p:ext>
+  </p:extLst>
 </p:presentation>
 </file>
 
@@ -275,7 +280,7 @@
           <a:p>
             <a:fld id="{1160EA64-D806-43AC-9DF2-F8C432F32B4C}" type="datetimeFigureOut">
               <a:rPr lang="en-US" dirty="0"/>
-              <a:t>4/7/20</a:t>
+              <a:t>4/9/2020</a:t>
             </a:fld>
             <a:endParaRPr lang="en-US" dirty="0"/>
           </a:p>
@@ -441,7 +446,7 @@
           <a:p>
             <a:fld id="{E9F9C37B-1D36-470B-8223-D6C91242EC14}" type="datetimeFigureOut">
               <a:rPr lang="en-US" dirty="0"/>
-              <a:t>4/7/20</a:t>
+              <a:t>4/9/2020</a:t>
             </a:fld>
             <a:endParaRPr lang="en-US" dirty="0"/>
           </a:p>
@@ -616,7 +621,7 @@
           <a:p>
             <a:fld id="{67C6F52A-A82B-47A2-A83A-8C4C91F2D59F}" type="datetimeFigureOut">
               <a:rPr lang="en-US" dirty="0"/>
-              <a:t>4/7/20</a:t>
+              <a:t>4/9/2020</a:t>
             </a:fld>
             <a:endParaRPr lang="en-US" dirty="0"/>
           </a:p>
@@ -811,7 +816,7 @@
           <a:p>
             <a:fld id="{F070A7B3-6521-4DCA-87E5-044747A908C1}" type="datetimeFigureOut">
               <a:rPr lang="en-US" dirty="0"/>
-              <a:t>4/7/20</a:t>
+              <a:t>4/9/2020</a:t>
             </a:fld>
             <a:endParaRPr lang="en-US" dirty="0"/>
           </a:p>
@@ -1076,7 +1081,7 @@
           <a:p>
             <a:fld id="{1160EA64-D806-43AC-9DF2-F8C432F32B4C}" type="datetimeFigureOut">
               <a:rPr lang="en-US" dirty="0"/>
-              <a:t>4/7/20</a:t>
+              <a:t>4/9/2020</a:t>
             </a:fld>
             <a:endParaRPr lang="en-US" dirty="0"/>
           </a:p>
@@ -1359,7 +1364,7 @@
           <a:p>
             <a:fld id="{AB134690-1557-4C89-A502-4959FE7FAD70}" type="datetimeFigureOut">
               <a:rPr lang="en-US" dirty="0"/>
-              <a:t>4/7/20</a:t>
+              <a:t>4/9/2020</a:t>
             </a:fld>
             <a:endParaRPr lang="en-US" dirty="0"/>
           </a:p>
@@ -1761,7 +1766,7 @@
           <a:p>
             <a:fld id="{4F7D4976-E339-4826-83B7-FBD03F55ECF8}" type="datetimeFigureOut">
               <a:rPr lang="en-US" dirty="0"/>
-              <a:t>4/7/20</a:t>
+              <a:t>4/9/2020</a:t>
             </a:fld>
             <a:endParaRPr lang="en-US" dirty="0"/>
           </a:p>
@@ -1907,7 +1912,7 @@
           <a:p>
             <a:fld id="{E1037C31-9E7A-4F99-8774-A0E530DE1A42}" type="datetimeFigureOut">
               <a:rPr lang="en-US" dirty="0"/>
-              <a:t>4/7/20</a:t>
+              <a:t>4/9/2020</a:t>
             </a:fld>
             <a:endParaRPr lang="en-US" dirty="0"/>
           </a:p>
@@ -1997,7 +2002,7 @@
           <a:p>
             <a:fld id="{C278504F-A551-4DE0-9316-4DCD1D8CC752}" type="datetimeFigureOut">
               <a:rPr lang="en-US" dirty="0"/>
-              <a:t>4/7/20</a:t>
+              <a:t>4/9/2020</a:t>
             </a:fld>
             <a:endParaRPr lang="en-US" dirty="0"/>
           </a:p>
@@ -2348,7 +2353,7 @@
           <a:p>
             <a:fld id="{D1BE4249-C0D0-4B06-8692-E8BB871AF643}" type="datetimeFigureOut">
               <a:rPr lang="en-US" dirty="0"/>
-              <a:t>4/7/20</a:t>
+              <a:t>4/9/2020</a:t>
             </a:fld>
             <a:endParaRPr lang="en-US" dirty="0"/>
           </a:p>
@@ -2700,7 +2705,7 @@
           <a:p>
             <a:fld id="{042B0DB6-F5C7-45FB-8CF3-31B45F9C2DAC}" type="datetimeFigureOut">
               <a:rPr lang="en-US" dirty="0"/>
-              <a:t>4/7/20</a:t>
+              <a:t>4/9/2020</a:t>
             </a:fld>
             <a:endParaRPr lang="en-US" dirty="0"/>
           </a:p>
@@ -2937,7 +2942,7 @@
           <a:p>
             <a:fld id="{1160EA64-D806-43AC-9DF2-F8C432F32B4C}" type="datetimeFigureOut">
               <a:rPr lang="en-US" dirty="0"/>
-              <a:t>4/7/20</a:t>
+              <a:t>4/9/2020</a:t>
             </a:fld>
             <a:endParaRPr lang="en-US" dirty="0"/>
           </a:p>
@@ -3454,6 +3459,43 @@
           </a:p>
         </p:txBody>
       </p:sp>
+      <p:sp>
+        <p:nvSpPr>
+          <p:cNvPr id="4" name="TextBox 3">
+            <a:extLst>
+              <a:ext uri="{FF2B5EF4-FFF2-40B4-BE49-F238E27FC236}">
+                <a16:creationId xmlns:a16="http://schemas.microsoft.com/office/drawing/2014/main" id="{EAA4A9BC-82CE-49F6-8EC5-F7CD301707B0}"/>
+              </a:ext>
+            </a:extLst>
+          </p:cNvPr>
+          <p:cNvSpPr txBox="1"/>
+          <p:nvPr/>
+        </p:nvSpPr>
+        <p:spPr>
+          <a:xfrm>
+            <a:off x="813910" y="5743852"/>
+            <a:ext cx="3762568" cy="369332"/>
+          </a:xfrm>
+          <a:prstGeom prst="rect">
+            <a:avLst/>
+          </a:prstGeom>
+          <a:noFill/>
+        </p:spPr>
+        <p:txBody>
+          <a:bodyPr wrap="none" rtlCol="0">
+            <a:spAutoFit/>
+          </a:bodyPr>
+          <a:lstStyle/>
+          <a:p>
+            <a:r>
+              <a:rPr lang="en-US" dirty="0">
+                <a:latin typeface="Inconsolata" panose="00000509000000000000" pitchFamily="49" charset="0"/>
+              </a:rPr>
+              <a:t>Notes compiled 4/7/20, Sean Lai</a:t>
+            </a:r>
+          </a:p>
+        </p:txBody>
+      </p:sp>
     </p:spTree>
     <p:extLst>
       <p:ext uri="{BB962C8B-B14F-4D97-AF65-F5344CB8AC3E}">

</xml_diff>